<commit_message>
actualice el informe final
</commit_message>
<xml_diff>
--- a/Diagrama Logico.pptx
+++ b/Diagrama Logico.pptx
@@ -134,7 +134,7 @@
           <p:cNvPr id="2" name="Título 1">
             <a:extLst>
               <a:ext uri="{FF2B5EF4-FFF2-40B4-BE49-F238E27FC236}">
-                <a16:creationId xmlns:a16="http://schemas.microsoft.com/office/drawing/2014/main" xmlns="" id="{D12C613A-4FDE-4B3C-B68E-DE9949C1A211}"/>
+                <a16:creationId xmlns:a16="http://schemas.microsoft.com/office/drawing/2014/main" id="{D12C613A-4FDE-4B3C-B68E-DE9949C1A211}"/>
               </a:ext>
             </a:extLst>
           </p:cNvPr>
@@ -172,7 +172,7 @@
           <p:cNvPr id="3" name="Subtítulo 2">
             <a:extLst>
               <a:ext uri="{FF2B5EF4-FFF2-40B4-BE49-F238E27FC236}">
-                <a16:creationId xmlns:a16="http://schemas.microsoft.com/office/drawing/2014/main" xmlns="" id="{F7E8418B-98C8-4452-8DFF-DF94E31F2CD7}"/>
+                <a16:creationId xmlns:a16="http://schemas.microsoft.com/office/drawing/2014/main" id="{F7E8418B-98C8-4452-8DFF-DF94E31F2CD7}"/>
               </a:ext>
             </a:extLst>
           </p:cNvPr>
@@ -243,7 +243,7 @@
           <p:cNvPr id="4" name="Marcador de fecha 3">
             <a:extLst>
               <a:ext uri="{FF2B5EF4-FFF2-40B4-BE49-F238E27FC236}">
-                <a16:creationId xmlns:a16="http://schemas.microsoft.com/office/drawing/2014/main" xmlns="" id="{CBD2E4EE-FD87-4A55-B1FB-68753D95180E}"/>
+                <a16:creationId xmlns:a16="http://schemas.microsoft.com/office/drawing/2014/main" id="{CBD2E4EE-FD87-4A55-B1FB-68753D95180E}"/>
               </a:ext>
             </a:extLst>
           </p:cNvPr>
@@ -261,7 +261,7 @@
           <a:p>
             <a:fld id="{2CB0E3BD-6D34-458E-AE7A-74577911A74C}" type="datetimeFigureOut">
               <a:rPr lang="es-AR" smtClean="0"/>
-              <a:t>11/06/2019</a:t>
+              <a:t>1/7/2019</a:t>
             </a:fld>
             <a:endParaRPr lang="es-AR"/>
           </a:p>
@@ -272,7 +272,7 @@
           <p:cNvPr id="5" name="Marcador de pie de página 4">
             <a:extLst>
               <a:ext uri="{FF2B5EF4-FFF2-40B4-BE49-F238E27FC236}">
-                <a16:creationId xmlns:a16="http://schemas.microsoft.com/office/drawing/2014/main" xmlns="" id="{EC3E6940-5E9A-427E-A433-3C0B6DB9827E}"/>
+                <a16:creationId xmlns:a16="http://schemas.microsoft.com/office/drawing/2014/main" id="{EC3E6940-5E9A-427E-A433-3C0B6DB9827E}"/>
               </a:ext>
             </a:extLst>
           </p:cNvPr>
@@ -297,7 +297,7 @@
           <p:cNvPr id="6" name="Marcador de número de diapositiva 5">
             <a:extLst>
               <a:ext uri="{FF2B5EF4-FFF2-40B4-BE49-F238E27FC236}">
-                <a16:creationId xmlns:a16="http://schemas.microsoft.com/office/drawing/2014/main" xmlns="" id="{DF589638-7862-44B4-848D-F7F025CA0159}"/>
+                <a16:creationId xmlns:a16="http://schemas.microsoft.com/office/drawing/2014/main" id="{DF589638-7862-44B4-848D-F7F025CA0159}"/>
               </a:ext>
             </a:extLst>
           </p:cNvPr>
@@ -356,7 +356,7 @@
           <p:cNvPr id="2" name="Título 1">
             <a:extLst>
               <a:ext uri="{FF2B5EF4-FFF2-40B4-BE49-F238E27FC236}">
-                <a16:creationId xmlns:a16="http://schemas.microsoft.com/office/drawing/2014/main" xmlns="" id="{8032C9FD-D3D8-4FEA-BDEA-CE690D4AE1AF}"/>
+                <a16:creationId xmlns:a16="http://schemas.microsoft.com/office/drawing/2014/main" id="{8032C9FD-D3D8-4FEA-BDEA-CE690D4AE1AF}"/>
               </a:ext>
             </a:extLst>
           </p:cNvPr>
@@ -385,7 +385,7 @@
           <p:cNvPr id="3" name="Marcador de texto vertical 2">
             <a:extLst>
               <a:ext uri="{FF2B5EF4-FFF2-40B4-BE49-F238E27FC236}">
-                <a16:creationId xmlns:a16="http://schemas.microsoft.com/office/drawing/2014/main" xmlns="" id="{B2A2BAF1-7E07-4A31-BCAB-3F137B26F2AC}"/>
+                <a16:creationId xmlns:a16="http://schemas.microsoft.com/office/drawing/2014/main" id="{B2A2BAF1-7E07-4A31-BCAB-3F137B26F2AC}"/>
               </a:ext>
             </a:extLst>
           </p:cNvPr>
@@ -443,7 +443,7 @@
           <p:cNvPr id="4" name="Marcador de fecha 3">
             <a:extLst>
               <a:ext uri="{FF2B5EF4-FFF2-40B4-BE49-F238E27FC236}">
-                <a16:creationId xmlns:a16="http://schemas.microsoft.com/office/drawing/2014/main" xmlns="" id="{B782B7E6-E1CB-40F2-9BFA-30C48E0895DD}"/>
+                <a16:creationId xmlns:a16="http://schemas.microsoft.com/office/drawing/2014/main" id="{B782B7E6-E1CB-40F2-9BFA-30C48E0895DD}"/>
               </a:ext>
             </a:extLst>
           </p:cNvPr>
@@ -461,7 +461,7 @@
           <a:p>
             <a:fld id="{2CB0E3BD-6D34-458E-AE7A-74577911A74C}" type="datetimeFigureOut">
               <a:rPr lang="es-AR" smtClean="0"/>
-              <a:t>11/06/2019</a:t>
+              <a:t>1/7/2019</a:t>
             </a:fld>
             <a:endParaRPr lang="es-AR"/>
           </a:p>
@@ -472,7 +472,7 @@
           <p:cNvPr id="5" name="Marcador de pie de página 4">
             <a:extLst>
               <a:ext uri="{FF2B5EF4-FFF2-40B4-BE49-F238E27FC236}">
-                <a16:creationId xmlns:a16="http://schemas.microsoft.com/office/drawing/2014/main" xmlns="" id="{BBAC68BC-13EE-4CD8-A450-0B6028668A22}"/>
+                <a16:creationId xmlns:a16="http://schemas.microsoft.com/office/drawing/2014/main" id="{BBAC68BC-13EE-4CD8-A450-0B6028668A22}"/>
               </a:ext>
             </a:extLst>
           </p:cNvPr>
@@ -497,7 +497,7 @@
           <p:cNvPr id="6" name="Marcador de número de diapositiva 5">
             <a:extLst>
               <a:ext uri="{FF2B5EF4-FFF2-40B4-BE49-F238E27FC236}">
-                <a16:creationId xmlns:a16="http://schemas.microsoft.com/office/drawing/2014/main" xmlns="" id="{122FC8BC-7D19-4D50-A3AB-4600BEF53387}"/>
+                <a16:creationId xmlns:a16="http://schemas.microsoft.com/office/drawing/2014/main" id="{122FC8BC-7D19-4D50-A3AB-4600BEF53387}"/>
               </a:ext>
             </a:extLst>
           </p:cNvPr>
@@ -556,7 +556,7 @@
           <p:cNvPr id="2" name="Título vertical 1">
             <a:extLst>
               <a:ext uri="{FF2B5EF4-FFF2-40B4-BE49-F238E27FC236}">
-                <a16:creationId xmlns:a16="http://schemas.microsoft.com/office/drawing/2014/main" xmlns="" id="{F6065C51-6665-427E-B936-50381D97FE22}"/>
+                <a16:creationId xmlns:a16="http://schemas.microsoft.com/office/drawing/2014/main" id="{F6065C51-6665-427E-B936-50381D97FE22}"/>
               </a:ext>
             </a:extLst>
           </p:cNvPr>
@@ -590,7 +590,7 @@
           <p:cNvPr id="3" name="Marcador de texto vertical 2">
             <a:extLst>
               <a:ext uri="{FF2B5EF4-FFF2-40B4-BE49-F238E27FC236}">
-                <a16:creationId xmlns:a16="http://schemas.microsoft.com/office/drawing/2014/main" xmlns="" id="{7798C3E4-713F-47A9-8ED4-EEAB18D007F4}"/>
+                <a16:creationId xmlns:a16="http://schemas.microsoft.com/office/drawing/2014/main" id="{7798C3E4-713F-47A9-8ED4-EEAB18D007F4}"/>
               </a:ext>
             </a:extLst>
           </p:cNvPr>
@@ -653,7 +653,7 @@
           <p:cNvPr id="4" name="Marcador de fecha 3">
             <a:extLst>
               <a:ext uri="{FF2B5EF4-FFF2-40B4-BE49-F238E27FC236}">
-                <a16:creationId xmlns:a16="http://schemas.microsoft.com/office/drawing/2014/main" xmlns="" id="{F7023CF1-E04E-437B-9673-4EA8BF3EE1CC}"/>
+                <a16:creationId xmlns:a16="http://schemas.microsoft.com/office/drawing/2014/main" id="{F7023CF1-E04E-437B-9673-4EA8BF3EE1CC}"/>
               </a:ext>
             </a:extLst>
           </p:cNvPr>
@@ -671,7 +671,7 @@
           <a:p>
             <a:fld id="{2CB0E3BD-6D34-458E-AE7A-74577911A74C}" type="datetimeFigureOut">
               <a:rPr lang="es-AR" smtClean="0"/>
-              <a:t>11/06/2019</a:t>
+              <a:t>1/7/2019</a:t>
             </a:fld>
             <a:endParaRPr lang="es-AR"/>
           </a:p>
@@ -682,7 +682,7 @@
           <p:cNvPr id="5" name="Marcador de pie de página 4">
             <a:extLst>
               <a:ext uri="{FF2B5EF4-FFF2-40B4-BE49-F238E27FC236}">
-                <a16:creationId xmlns:a16="http://schemas.microsoft.com/office/drawing/2014/main" xmlns="" id="{924F506A-5B4A-4597-BD35-34D02DD9BE92}"/>
+                <a16:creationId xmlns:a16="http://schemas.microsoft.com/office/drawing/2014/main" id="{924F506A-5B4A-4597-BD35-34D02DD9BE92}"/>
               </a:ext>
             </a:extLst>
           </p:cNvPr>
@@ -707,7 +707,7 @@
           <p:cNvPr id="6" name="Marcador de número de diapositiva 5">
             <a:extLst>
               <a:ext uri="{FF2B5EF4-FFF2-40B4-BE49-F238E27FC236}">
-                <a16:creationId xmlns:a16="http://schemas.microsoft.com/office/drawing/2014/main" xmlns="" id="{AAA187E8-A967-4BD4-AAB8-392B7F1DD75E}"/>
+                <a16:creationId xmlns:a16="http://schemas.microsoft.com/office/drawing/2014/main" id="{AAA187E8-A967-4BD4-AAB8-392B7F1DD75E}"/>
               </a:ext>
             </a:extLst>
           </p:cNvPr>
@@ -766,7 +766,7 @@
           <p:cNvPr id="2" name="Título 1">
             <a:extLst>
               <a:ext uri="{FF2B5EF4-FFF2-40B4-BE49-F238E27FC236}">
-                <a16:creationId xmlns:a16="http://schemas.microsoft.com/office/drawing/2014/main" xmlns="" id="{80F861DC-B262-4185-AA2B-3480048A81D2}"/>
+                <a16:creationId xmlns:a16="http://schemas.microsoft.com/office/drawing/2014/main" id="{80F861DC-B262-4185-AA2B-3480048A81D2}"/>
               </a:ext>
             </a:extLst>
           </p:cNvPr>
@@ -795,7 +795,7 @@
           <p:cNvPr id="3" name="Marcador de contenido 2">
             <a:extLst>
               <a:ext uri="{FF2B5EF4-FFF2-40B4-BE49-F238E27FC236}">
-                <a16:creationId xmlns:a16="http://schemas.microsoft.com/office/drawing/2014/main" xmlns="" id="{702C3480-732C-4473-9409-E686E69FDDB7}"/>
+                <a16:creationId xmlns:a16="http://schemas.microsoft.com/office/drawing/2014/main" id="{702C3480-732C-4473-9409-E686E69FDDB7}"/>
               </a:ext>
             </a:extLst>
           </p:cNvPr>
@@ -853,7 +853,7 @@
           <p:cNvPr id="4" name="Marcador de fecha 3">
             <a:extLst>
               <a:ext uri="{FF2B5EF4-FFF2-40B4-BE49-F238E27FC236}">
-                <a16:creationId xmlns:a16="http://schemas.microsoft.com/office/drawing/2014/main" xmlns="" id="{1A4861FD-BFB6-4659-A42D-E09E7CC0E028}"/>
+                <a16:creationId xmlns:a16="http://schemas.microsoft.com/office/drawing/2014/main" id="{1A4861FD-BFB6-4659-A42D-E09E7CC0E028}"/>
               </a:ext>
             </a:extLst>
           </p:cNvPr>
@@ -871,7 +871,7 @@
           <a:p>
             <a:fld id="{2CB0E3BD-6D34-458E-AE7A-74577911A74C}" type="datetimeFigureOut">
               <a:rPr lang="es-AR" smtClean="0"/>
-              <a:t>11/06/2019</a:t>
+              <a:t>1/7/2019</a:t>
             </a:fld>
             <a:endParaRPr lang="es-AR"/>
           </a:p>
@@ -882,7 +882,7 @@
           <p:cNvPr id="5" name="Marcador de pie de página 4">
             <a:extLst>
               <a:ext uri="{FF2B5EF4-FFF2-40B4-BE49-F238E27FC236}">
-                <a16:creationId xmlns:a16="http://schemas.microsoft.com/office/drawing/2014/main" xmlns="" id="{B227D65C-B1EC-4AD1-8C5A-AA17CEDB1283}"/>
+                <a16:creationId xmlns:a16="http://schemas.microsoft.com/office/drawing/2014/main" id="{B227D65C-B1EC-4AD1-8C5A-AA17CEDB1283}"/>
               </a:ext>
             </a:extLst>
           </p:cNvPr>
@@ -907,7 +907,7 @@
           <p:cNvPr id="6" name="Marcador de número de diapositiva 5">
             <a:extLst>
               <a:ext uri="{FF2B5EF4-FFF2-40B4-BE49-F238E27FC236}">
-                <a16:creationId xmlns:a16="http://schemas.microsoft.com/office/drawing/2014/main" xmlns="" id="{52F0B411-7CB0-4CA6-9622-90AF5C17B76D}"/>
+                <a16:creationId xmlns:a16="http://schemas.microsoft.com/office/drawing/2014/main" id="{52F0B411-7CB0-4CA6-9622-90AF5C17B76D}"/>
               </a:ext>
             </a:extLst>
           </p:cNvPr>
@@ -966,7 +966,7 @@
           <p:cNvPr id="2" name="Título 1">
             <a:extLst>
               <a:ext uri="{FF2B5EF4-FFF2-40B4-BE49-F238E27FC236}">
-                <a16:creationId xmlns:a16="http://schemas.microsoft.com/office/drawing/2014/main" xmlns="" id="{5A8445F4-7050-487D-8163-0493EEC3D467}"/>
+                <a16:creationId xmlns:a16="http://schemas.microsoft.com/office/drawing/2014/main" id="{5A8445F4-7050-487D-8163-0493EEC3D467}"/>
               </a:ext>
             </a:extLst>
           </p:cNvPr>
@@ -1004,7 +1004,7 @@
           <p:cNvPr id="3" name="Marcador de texto 2">
             <a:extLst>
               <a:ext uri="{FF2B5EF4-FFF2-40B4-BE49-F238E27FC236}">
-                <a16:creationId xmlns:a16="http://schemas.microsoft.com/office/drawing/2014/main" xmlns="" id="{9DAF945F-55E6-430A-B051-F852BADCF543}"/>
+                <a16:creationId xmlns:a16="http://schemas.microsoft.com/office/drawing/2014/main" id="{9DAF945F-55E6-430A-B051-F852BADCF543}"/>
               </a:ext>
             </a:extLst>
           </p:cNvPr>
@@ -1129,7 +1129,7 @@
           <p:cNvPr id="4" name="Marcador de fecha 3">
             <a:extLst>
               <a:ext uri="{FF2B5EF4-FFF2-40B4-BE49-F238E27FC236}">
-                <a16:creationId xmlns:a16="http://schemas.microsoft.com/office/drawing/2014/main" xmlns="" id="{DE7345A4-B570-4D96-A8B8-EE5ED8871BBC}"/>
+                <a16:creationId xmlns:a16="http://schemas.microsoft.com/office/drawing/2014/main" id="{DE7345A4-B570-4D96-A8B8-EE5ED8871BBC}"/>
               </a:ext>
             </a:extLst>
           </p:cNvPr>
@@ -1147,7 +1147,7 @@
           <a:p>
             <a:fld id="{2CB0E3BD-6D34-458E-AE7A-74577911A74C}" type="datetimeFigureOut">
               <a:rPr lang="es-AR" smtClean="0"/>
-              <a:t>11/06/2019</a:t>
+              <a:t>1/7/2019</a:t>
             </a:fld>
             <a:endParaRPr lang="es-AR"/>
           </a:p>
@@ -1158,7 +1158,7 @@
           <p:cNvPr id="5" name="Marcador de pie de página 4">
             <a:extLst>
               <a:ext uri="{FF2B5EF4-FFF2-40B4-BE49-F238E27FC236}">
-                <a16:creationId xmlns:a16="http://schemas.microsoft.com/office/drawing/2014/main" xmlns="" id="{8DB18A30-BA89-4D0F-8F58-3EAEA3451842}"/>
+                <a16:creationId xmlns:a16="http://schemas.microsoft.com/office/drawing/2014/main" id="{8DB18A30-BA89-4D0F-8F58-3EAEA3451842}"/>
               </a:ext>
             </a:extLst>
           </p:cNvPr>
@@ -1183,7 +1183,7 @@
           <p:cNvPr id="6" name="Marcador de número de diapositiva 5">
             <a:extLst>
               <a:ext uri="{FF2B5EF4-FFF2-40B4-BE49-F238E27FC236}">
-                <a16:creationId xmlns:a16="http://schemas.microsoft.com/office/drawing/2014/main" xmlns="" id="{392749C8-CD30-4CEC-A44E-C63C5AB5DC80}"/>
+                <a16:creationId xmlns:a16="http://schemas.microsoft.com/office/drawing/2014/main" id="{392749C8-CD30-4CEC-A44E-C63C5AB5DC80}"/>
               </a:ext>
             </a:extLst>
           </p:cNvPr>
@@ -1242,7 +1242,7 @@
           <p:cNvPr id="2" name="Título 1">
             <a:extLst>
               <a:ext uri="{FF2B5EF4-FFF2-40B4-BE49-F238E27FC236}">
-                <a16:creationId xmlns:a16="http://schemas.microsoft.com/office/drawing/2014/main" xmlns="" id="{AF455A4E-362D-4597-ADE7-FA5825C8FE9F}"/>
+                <a16:creationId xmlns:a16="http://schemas.microsoft.com/office/drawing/2014/main" id="{AF455A4E-362D-4597-ADE7-FA5825C8FE9F}"/>
               </a:ext>
             </a:extLst>
           </p:cNvPr>
@@ -1271,7 +1271,7 @@
           <p:cNvPr id="3" name="Marcador de contenido 2">
             <a:extLst>
               <a:ext uri="{FF2B5EF4-FFF2-40B4-BE49-F238E27FC236}">
-                <a16:creationId xmlns:a16="http://schemas.microsoft.com/office/drawing/2014/main" xmlns="" id="{7B3B523C-D464-4B46-91D0-DF736E9A72B9}"/>
+                <a16:creationId xmlns:a16="http://schemas.microsoft.com/office/drawing/2014/main" id="{7B3B523C-D464-4B46-91D0-DF736E9A72B9}"/>
               </a:ext>
             </a:extLst>
           </p:cNvPr>
@@ -1334,7 +1334,7 @@
           <p:cNvPr id="4" name="Marcador de contenido 3">
             <a:extLst>
               <a:ext uri="{FF2B5EF4-FFF2-40B4-BE49-F238E27FC236}">
-                <a16:creationId xmlns:a16="http://schemas.microsoft.com/office/drawing/2014/main" xmlns="" id="{9A432D55-1841-46B8-9DBA-1237DC2DDFF6}"/>
+                <a16:creationId xmlns:a16="http://schemas.microsoft.com/office/drawing/2014/main" id="{9A432D55-1841-46B8-9DBA-1237DC2DDFF6}"/>
               </a:ext>
             </a:extLst>
           </p:cNvPr>
@@ -1397,7 +1397,7 @@
           <p:cNvPr id="5" name="Marcador de fecha 4">
             <a:extLst>
               <a:ext uri="{FF2B5EF4-FFF2-40B4-BE49-F238E27FC236}">
-                <a16:creationId xmlns:a16="http://schemas.microsoft.com/office/drawing/2014/main" xmlns="" id="{2EFF7AAC-0A94-4A93-BA2A-99526C7E5588}"/>
+                <a16:creationId xmlns:a16="http://schemas.microsoft.com/office/drawing/2014/main" id="{2EFF7AAC-0A94-4A93-BA2A-99526C7E5588}"/>
               </a:ext>
             </a:extLst>
           </p:cNvPr>
@@ -1415,7 +1415,7 @@
           <a:p>
             <a:fld id="{2CB0E3BD-6D34-458E-AE7A-74577911A74C}" type="datetimeFigureOut">
               <a:rPr lang="es-AR" smtClean="0"/>
-              <a:t>11/06/2019</a:t>
+              <a:t>1/7/2019</a:t>
             </a:fld>
             <a:endParaRPr lang="es-AR"/>
           </a:p>
@@ -1426,7 +1426,7 @@
           <p:cNvPr id="6" name="Marcador de pie de página 5">
             <a:extLst>
               <a:ext uri="{FF2B5EF4-FFF2-40B4-BE49-F238E27FC236}">
-                <a16:creationId xmlns:a16="http://schemas.microsoft.com/office/drawing/2014/main" xmlns="" id="{E98875B3-900D-47DA-B9D1-85190E0F6784}"/>
+                <a16:creationId xmlns:a16="http://schemas.microsoft.com/office/drawing/2014/main" id="{E98875B3-900D-47DA-B9D1-85190E0F6784}"/>
               </a:ext>
             </a:extLst>
           </p:cNvPr>
@@ -1451,7 +1451,7 @@
           <p:cNvPr id="7" name="Marcador de número de diapositiva 6">
             <a:extLst>
               <a:ext uri="{FF2B5EF4-FFF2-40B4-BE49-F238E27FC236}">
-                <a16:creationId xmlns:a16="http://schemas.microsoft.com/office/drawing/2014/main" xmlns="" id="{5199EFF7-E98D-4ACC-93FC-0C5809773EF0}"/>
+                <a16:creationId xmlns:a16="http://schemas.microsoft.com/office/drawing/2014/main" id="{5199EFF7-E98D-4ACC-93FC-0C5809773EF0}"/>
               </a:ext>
             </a:extLst>
           </p:cNvPr>
@@ -1510,7 +1510,7 @@
           <p:cNvPr id="2" name="Título 1">
             <a:extLst>
               <a:ext uri="{FF2B5EF4-FFF2-40B4-BE49-F238E27FC236}">
-                <a16:creationId xmlns:a16="http://schemas.microsoft.com/office/drawing/2014/main" xmlns="" id="{31E64298-EFF8-45B2-A732-273BF959FDBA}"/>
+                <a16:creationId xmlns:a16="http://schemas.microsoft.com/office/drawing/2014/main" id="{31E64298-EFF8-45B2-A732-273BF959FDBA}"/>
               </a:ext>
             </a:extLst>
           </p:cNvPr>
@@ -1544,7 +1544,7 @@
           <p:cNvPr id="3" name="Marcador de texto 2">
             <a:extLst>
               <a:ext uri="{FF2B5EF4-FFF2-40B4-BE49-F238E27FC236}">
-                <a16:creationId xmlns:a16="http://schemas.microsoft.com/office/drawing/2014/main" xmlns="" id="{F2638E33-47D0-4520-86FF-B3EEC49A15BD}"/>
+                <a16:creationId xmlns:a16="http://schemas.microsoft.com/office/drawing/2014/main" id="{F2638E33-47D0-4520-86FF-B3EEC49A15BD}"/>
               </a:ext>
             </a:extLst>
           </p:cNvPr>
@@ -1615,7 +1615,7 @@
           <p:cNvPr id="4" name="Marcador de contenido 3">
             <a:extLst>
               <a:ext uri="{FF2B5EF4-FFF2-40B4-BE49-F238E27FC236}">
-                <a16:creationId xmlns:a16="http://schemas.microsoft.com/office/drawing/2014/main" xmlns="" id="{6D7590F5-9B0A-4BF0-8B6A-F3D1D03212A7}"/>
+                <a16:creationId xmlns:a16="http://schemas.microsoft.com/office/drawing/2014/main" id="{6D7590F5-9B0A-4BF0-8B6A-F3D1D03212A7}"/>
               </a:ext>
             </a:extLst>
           </p:cNvPr>
@@ -1678,7 +1678,7 @@
           <p:cNvPr id="5" name="Marcador de texto 4">
             <a:extLst>
               <a:ext uri="{FF2B5EF4-FFF2-40B4-BE49-F238E27FC236}">
-                <a16:creationId xmlns:a16="http://schemas.microsoft.com/office/drawing/2014/main" xmlns="" id="{63216476-9ABF-4D07-B0F8-44C99CCB6F89}"/>
+                <a16:creationId xmlns:a16="http://schemas.microsoft.com/office/drawing/2014/main" id="{63216476-9ABF-4D07-B0F8-44C99CCB6F89}"/>
               </a:ext>
             </a:extLst>
           </p:cNvPr>
@@ -1749,7 +1749,7 @@
           <p:cNvPr id="6" name="Marcador de contenido 5">
             <a:extLst>
               <a:ext uri="{FF2B5EF4-FFF2-40B4-BE49-F238E27FC236}">
-                <a16:creationId xmlns:a16="http://schemas.microsoft.com/office/drawing/2014/main" xmlns="" id="{D765D6AD-B253-4A69-8BF8-F2A75814AFC5}"/>
+                <a16:creationId xmlns:a16="http://schemas.microsoft.com/office/drawing/2014/main" id="{D765D6AD-B253-4A69-8BF8-F2A75814AFC5}"/>
               </a:ext>
             </a:extLst>
           </p:cNvPr>
@@ -1812,7 +1812,7 @@
           <p:cNvPr id="7" name="Marcador de fecha 6">
             <a:extLst>
               <a:ext uri="{FF2B5EF4-FFF2-40B4-BE49-F238E27FC236}">
-                <a16:creationId xmlns:a16="http://schemas.microsoft.com/office/drawing/2014/main" xmlns="" id="{8391FB3A-EA74-44A6-87F9-1C412E217E15}"/>
+                <a16:creationId xmlns:a16="http://schemas.microsoft.com/office/drawing/2014/main" id="{8391FB3A-EA74-44A6-87F9-1C412E217E15}"/>
               </a:ext>
             </a:extLst>
           </p:cNvPr>
@@ -1830,7 +1830,7 @@
           <a:p>
             <a:fld id="{2CB0E3BD-6D34-458E-AE7A-74577911A74C}" type="datetimeFigureOut">
               <a:rPr lang="es-AR" smtClean="0"/>
-              <a:t>11/06/2019</a:t>
+              <a:t>1/7/2019</a:t>
             </a:fld>
             <a:endParaRPr lang="es-AR"/>
           </a:p>
@@ -1841,7 +1841,7 @@
           <p:cNvPr id="8" name="Marcador de pie de página 7">
             <a:extLst>
               <a:ext uri="{FF2B5EF4-FFF2-40B4-BE49-F238E27FC236}">
-                <a16:creationId xmlns:a16="http://schemas.microsoft.com/office/drawing/2014/main" xmlns="" id="{2B196841-5C0D-4635-AF56-3A8CEF345D9E}"/>
+                <a16:creationId xmlns:a16="http://schemas.microsoft.com/office/drawing/2014/main" id="{2B196841-5C0D-4635-AF56-3A8CEF345D9E}"/>
               </a:ext>
             </a:extLst>
           </p:cNvPr>
@@ -1866,7 +1866,7 @@
           <p:cNvPr id="9" name="Marcador de número de diapositiva 8">
             <a:extLst>
               <a:ext uri="{FF2B5EF4-FFF2-40B4-BE49-F238E27FC236}">
-                <a16:creationId xmlns:a16="http://schemas.microsoft.com/office/drawing/2014/main" xmlns="" id="{68970DCF-9BA4-4780-9A2B-56E6077CC404}"/>
+                <a16:creationId xmlns:a16="http://schemas.microsoft.com/office/drawing/2014/main" id="{68970DCF-9BA4-4780-9A2B-56E6077CC404}"/>
               </a:ext>
             </a:extLst>
           </p:cNvPr>
@@ -1925,7 +1925,7 @@
           <p:cNvPr id="2" name="Título 1">
             <a:extLst>
               <a:ext uri="{FF2B5EF4-FFF2-40B4-BE49-F238E27FC236}">
-                <a16:creationId xmlns:a16="http://schemas.microsoft.com/office/drawing/2014/main" xmlns="" id="{333C85B7-0CFA-401C-BA25-6EDF9730EDE0}"/>
+                <a16:creationId xmlns:a16="http://schemas.microsoft.com/office/drawing/2014/main" id="{333C85B7-0CFA-401C-BA25-6EDF9730EDE0}"/>
               </a:ext>
             </a:extLst>
           </p:cNvPr>
@@ -1954,7 +1954,7 @@
           <p:cNvPr id="3" name="Marcador de fecha 2">
             <a:extLst>
               <a:ext uri="{FF2B5EF4-FFF2-40B4-BE49-F238E27FC236}">
-                <a16:creationId xmlns:a16="http://schemas.microsoft.com/office/drawing/2014/main" xmlns="" id="{EA6E3667-0E22-4721-85CC-B0D16D2EA0D8}"/>
+                <a16:creationId xmlns:a16="http://schemas.microsoft.com/office/drawing/2014/main" id="{EA6E3667-0E22-4721-85CC-B0D16D2EA0D8}"/>
               </a:ext>
             </a:extLst>
           </p:cNvPr>
@@ -1972,7 +1972,7 @@
           <a:p>
             <a:fld id="{2CB0E3BD-6D34-458E-AE7A-74577911A74C}" type="datetimeFigureOut">
               <a:rPr lang="es-AR" smtClean="0"/>
-              <a:t>11/06/2019</a:t>
+              <a:t>1/7/2019</a:t>
             </a:fld>
             <a:endParaRPr lang="es-AR"/>
           </a:p>
@@ -1983,7 +1983,7 @@
           <p:cNvPr id="4" name="Marcador de pie de página 3">
             <a:extLst>
               <a:ext uri="{FF2B5EF4-FFF2-40B4-BE49-F238E27FC236}">
-                <a16:creationId xmlns:a16="http://schemas.microsoft.com/office/drawing/2014/main" xmlns="" id="{3DB52BB3-FAB8-4468-866B-EC0ED9FB3886}"/>
+                <a16:creationId xmlns:a16="http://schemas.microsoft.com/office/drawing/2014/main" id="{3DB52BB3-FAB8-4468-866B-EC0ED9FB3886}"/>
               </a:ext>
             </a:extLst>
           </p:cNvPr>
@@ -2008,7 +2008,7 @@
           <p:cNvPr id="5" name="Marcador de número de diapositiva 4">
             <a:extLst>
               <a:ext uri="{FF2B5EF4-FFF2-40B4-BE49-F238E27FC236}">
-                <a16:creationId xmlns:a16="http://schemas.microsoft.com/office/drawing/2014/main" xmlns="" id="{3D6E29B7-AB26-470F-BEE4-C95788C48C31}"/>
+                <a16:creationId xmlns:a16="http://schemas.microsoft.com/office/drawing/2014/main" id="{3D6E29B7-AB26-470F-BEE4-C95788C48C31}"/>
               </a:ext>
             </a:extLst>
           </p:cNvPr>
@@ -2067,7 +2067,7 @@
           <p:cNvPr id="2" name="Marcador de fecha 1">
             <a:extLst>
               <a:ext uri="{FF2B5EF4-FFF2-40B4-BE49-F238E27FC236}">
-                <a16:creationId xmlns:a16="http://schemas.microsoft.com/office/drawing/2014/main" xmlns="" id="{C4795AE5-669D-4A88-8160-3E0B40EBB0FB}"/>
+                <a16:creationId xmlns:a16="http://schemas.microsoft.com/office/drawing/2014/main" id="{C4795AE5-669D-4A88-8160-3E0B40EBB0FB}"/>
               </a:ext>
             </a:extLst>
           </p:cNvPr>
@@ -2085,7 +2085,7 @@
           <a:p>
             <a:fld id="{2CB0E3BD-6D34-458E-AE7A-74577911A74C}" type="datetimeFigureOut">
               <a:rPr lang="es-AR" smtClean="0"/>
-              <a:t>11/06/2019</a:t>
+              <a:t>1/7/2019</a:t>
             </a:fld>
             <a:endParaRPr lang="es-AR"/>
           </a:p>
@@ -2096,7 +2096,7 @@
           <p:cNvPr id="3" name="Marcador de pie de página 2">
             <a:extLst>
               <a:ext uri="{FF2B5EF4-FFF2-40B4-BE49-F238E27FC236}">
-                <a16:creationId xmlns:a16="http://schemas.microsoft.com/office/drawing/2014/main" xmlns="" id="{28C00FA5-D866-4F67-853F-FD1EF5FF87A4}"/>
+                <a16:creationId xmlns:a16="http://schemas.microsoft.com/office/drawing/2014/main" id="{28C00FA5-D866-4F67-853F-FD1EF5FF87A4}"/>
               </a:ext>
             </a:extLst>
           </p:cNvPr>
@@ -2121,7 +2121,7 @@
           <p:cNvPr id="4" name="Marcador de número de diapositiva 3">
             <a:extLst>
               <a:ext uri="{FF2B5EF4-FFF2-40B4-BE49-F238E27FC236}">
-                <a16:creationId xmlns:a16="http://schemas.microsoft.com/office/drawing/2014/main" xmlns="" id="{8D5A7DB7-C12E-40B5-BADD-D51FDD8D5830}"/>
+                <a16:creationId xmlns:a16="http://schemas.microsoft.com/office/drawing/2014/main" id="{8D5A7DB7-C12E-40B5-BADD-D51FDD8D5830}"/>
               </a:ext>
             </a:extLst>
           </p:cNvPr>
@@ -2180,7 +2180,7 @@
           <p:cNvPr id="2" name="Título 1">
             <a:extLst>
               <a:ext uri="{FF2B5EF4-FFF2-40B4-BE49-F238E27FC236}">
-                <a16:creationId xmlns:a16="http://schemas.microsoft.com/office/drawing/2014/main" xmlns="" id="{82B28AE7-DECB-4527-B509-DD6DA7987D53}"/>
+                <a16:creationId xmlns:a16="http://schemas.microsoft.com/office/drawing/2014/main" id="{82B28AE7-DECB-4527-B509-DD6DA7987D53}"/>
               </a:ext>
             </a:extLst>
           </p:cNvPr>
@@ -2218,7 +2218,7 @@
           <p:cNvPr id="3" name="Marcador de contenido 2">
             <a:extLst>
               <a:ext uri="{FF2B5EF4-FFF2-40B4-BE49-F238E27FC236}">
-                <a16:creationId xmlns:a16="http://schemas.microsoft.com/office/drawing/2014/main" xmlns="" id="{720403EB-DEBE-4F91-AE22-7931332D8830}"/>
+                <a16:creationId xmlns:a16="http://schemas.microsoft.com/office/drawing/2014/main" id="{720403EB-DEBE-4F91-AE22-7931332D8830}"/>
               </a:ext>
             </a:extLst>
           </p:cNvPr>
@@ -2309,7 +2309,7 @@
           <p:cNvPr id="4" name="Marcador de texto 3">
             <a:extLst>
               <a:ext uri="{FF2B5EF4-FFF2-40B4-BE49-F238E27FC236}">
-                <a16:creationId xmlns:a16="http://schemas.microsoft.com/office/drawing/2014/main" xmlns="" id="{62AADB87-4F91-43D1-AD46-217023C0C86B}"/>
+                <a16:creationId xmlns:a16="http://schemas.microsoft.com/office/drawing/2014/main" id="{62AADB87-4F91-43D1-AD46-217023C0C86B}"/>
               </a:ext>
             </a:extLst>
           </p:cNvPr>
@@ -2380,7 +2380,7 @@
           <p:cNvPr id="5" name="Marcador de fecha 4">
             <a:extLst>
               <a:ext uri="{FF2B5EF4-FFF2-40B4-BE49-F238E27FC236}">
-                <a16:creationId xmlns:a16="http://schemas.microsoft.com/office/drawing/2014/main" xmlns="" id="{5047B00E-0FED-4D78-AAF3-1FFBCF4ADEF3}"/>
+                <a16:creationId xmlns:a16="http://schemas.microsoft.com/office/drawing/2014/main" id="{5047B00E-0FED-4D78-AAF3-1FFBCF4ADEF3}"/>
               </a:ext>
             </a:extLst>
           </p:cNvPr>
@@ -2398,7 +2398,7 @@
           <a:p>
             <a:fld id="{2CB0E3BD-6D34-458E-AE7A-74577911A74C}" type="datetimeFigureOut">
               <a:rPr lang="es-AR" smtClean="0"/>
-              <a:t>11/06/2019</a:t>
+              <a:t>1/7/2019</a:t>
             </a:fld>
             <a:endParaRPr lang="es-AR"/>
           </a:p>
@@ -2409,7 +2409,7 @@
           <p:cNvPr id="6" name="Marcador de pie de página 5">
             <a:extLst>
               <a:ext uri="{FF2B5EF4-FFF2-40B4-BE49-F238E27FC236}">
-                <a16:creationId xmlns:a16="http://schemas.microsoft.com/office/drawing/2014/main" xmlns="" id="{6E8C21D6-BAAE-4456-A4FC-E40323EE061D}"/>
+                <a16:creationId xmlns:a16="http://schemas.microsoft.com/office/drawing/2014/main" id="{6E8C21D6-BAAE-4456-A4FC-E40323EE061D}"/>
               </a:ext>
             </a:extLst>
           </p:cNvPr>
@@ -2434,7 +2434,7 @@
           <p:cNvPr id="7" name="Marcador de número de diapositiva 6">
             <a:extLst>
               <a:ext uri="{FF2B5EF4-FFF2-40B4-BE49-F238E27FC236}">
-                <a16:creationId xmlns:a16="http://schemas.microsoft.com/office/drawing/2014/main" xmlns="" id="{9CC2CCF4-3562-43E0-8972-AD2F33F27D6E}"/>
+                <a16:creationId xmlns:a16="http://schemas.microsoft.com/office/drawing/2014/main" id="{9CC2CCF4-3562-43E0-8972-AD2F33F27D6E}"/>
               </a:ext>
             </a:extLst>
           </p:cNvPr>
@@ -2493,7 +2493,7 @@
           <p:cNvPr id="2" name="Título 1">
             <a:extLst>
               <a:ext uri="{FF2B5EF4-FFF2-40B4-BE49-F238E27FC236}">
-                <a16:creationId xmlns:a16="http://schemas.microsoft.com/office/drawing/2014/main" xmlns="" id="{03F1F82F-9AC4-4AC0-8101-A11052597B29}"/>
+                <a16:creationId xmlns:a16="http://schemas.microsoft.com/office/drawing/2014/main" id="{03F1F82F-9AC4-4AC0-8101-A11052597B29}"/>
               </a:ext>
             </a:extLst>
           </p:cNvPr>
@@ -2531,7 +2531,7 @@
           <p:cNvPr id="3" name="Marcador de posición de imagen 2">
             <a:extLst>
               <a:ext uri="{FF2B5EF4-FFF2-40B4-BE49-F238E27FC236}">
-                <a16:creationId xmlns:a16="http://schemas.microsoft.com/office/drawing/2014/main" xmlns="" id="{D1876DD9-DF32-40A3-B439-005F558DB659}"/>
+                <a16:creationId xmlns:a16="http://schemas.microsoft.com/office/drawing/2014/main" id="{D1876DD9-DF32-40A3-B439-005F558DB659}"/>
               </a:ext>
             </a:extLst>
           </p:cNvPr>
@@ -2598,7 +2598,7 @@
           <p:cNvPr id="4" name="Marcador de texto 3">
             <a:extLst>
               <a:ext uri="{FF2B5EF4-FFF2-40B4-BE49-F238E27FC236}">
-                <a16:creationId xmlns:a16="http://schemas.microsoft.com/office/drawing/2014/main" xmlns="" id="{2C28E962-E41B-4471-A567-BDAF3BA93397}"/>
+                <a16:creationId xmlns:a16="http://schemas.microsoft.com/office/drawing/2014/main" id="{2C28E962-E41B-4471-A567-BDAF3BA93397}"/>
               </a:ext>
             </a:extLst>
           </p:cNvPr>
@@ -2669,7 +2669,7 @@
           <p:cNvPr id="5" name="Marcador de fecha 4">
             <a:extLst>
               <a:ext uri="{FF2B5EF4-FFF2-40B4-BE49-F238E27FC236}">
-                <a16:creationId xmlns:a16="http://schemas.microsoft.com/office/drawing/2014/main" xmlns="" id="{74E2DB00-BFD0-483E-9CDC-11D84685C6AD}"/>
+                <a16:creationId xmlns:a16="http://schemas.microsoft.com/office/drawing/2014/main" id="{74E2DB00-BFD0-483E-9CDC-11D84685C6AD}"/>
               </a:ext>
             </a:extLst>
           </p:cNvPr>
@@ -2687,7 +2687,7 @@
           <a:p>
             <a:fld id="{2CB0E3BD-6D34-458E-AE7A-74577911A74C}" type="datetimeFigureOut">
               <a:rPr lang="es-AR" smtClean="0"/>
-              <a:t>11/06/2019</a:t>
+              <a:t>1/7/2019</a:t>
             </a:fld>
             <a:endParaRPr lang="es-AR"/>
           </a:p>
@@ -2698,7 +2698,7 @@
           <p:cNvPr id="6" name="Marcador de pie de página 5">
             <a:extLst>
               <a:ext uri="{FF2B5EF4-FFF2-40B4-BE49-F238E27FC236}">
-                <a16:creationId xmlns:a16="http://schemas.microsoft.com/office/drawing/2014/main" xmlns="" id="{CF8828AC-5A82-4478-B5C2-9F5B1E08FF37}"/>
+                <a16:creationId xmlns:a16="http://schemas.microsoft.com/office/drawing/2014/main" id="{CF8828AC-5A82-4478-B5C2-9F5B1E08FF37}"/>
               </a:ext>
             </a:extLst>
           </p:cNvPr>
@@ -2723,7 +2723,7 @@
           <p:cNvPr id="7" name="Marcador de número de diapositiva 6">
             <a:extLst>
               <a:ext uri="{FF2B5EF4-FFF2-40B4-BE49-F238E27FC236}">
-                <a16:creationId xmlns:a16="http://schemas.microsoft.com/office/drawing/2014/main" xmlns="" id="{0CE17F75-BD3C-4666-8C76-3FA9F89DEA7F}"/>
+                <a16:creationId xmlns:a16="http://schemas.microsoft.com/office/drawing/2014/main" id="{0CE17F75-BD3C-4666-8C76-3FA9F89DEA7F}"/>
               </a:ext>
             </a:extLst>
           </p:cNvPr>
@@ -2787,7 +2787,7 @@
           <p:cNvPr id="2" name="Marcador de título 1">
             <a:extLst>
               <a:ext uri="{FF2B5EF4-FFF2-40B4-BE49-F238E27FC236}">
-                <a16:creationId xmlns:a16="http://schemas.microsoft.com/office/drawing/2014/main" xmlns="" id="{D47A80DC-F18B-429A-9BE7-A11F04B0F71F}"/>
+                <a16:creationId xmlns:a16="http://schemas.microsoft.com/office/drawing/2014/main" id="{D47A80DC-F18B-429A-9BE7-A11F04B0F71F}"/>
               </a:ext>
             </a:extLst>
           </p:cNvPr>
@@ -2826,7 +2826,7 @@
           <p:cNvPr id="3" name="Marcador de texto 2">
             <a:extLst>
               <a:ext uri="{FF2B5EF4-FFF2-40B4-BE49-F238E27FC236}">
-                <a16:creationId xmlns:a16="http://schemas.microsoft.com/office/drawing/2014/main" xmlns="" id="{EF2A5C17-57F2-4A80-91E2-76656477DBDA}"/>
+                <a16:creationId xmlns:a16="http://schemas.microsoft.com/office/drawing/2014/main" id="{EF2A5C17-57F2-4A80-91E2-76656477DBDA}"/>
               </a:ext>
             </a:extLst>
           </p:cNvPr>
@@ -2894,7 +2894,7 @@
           <p:cNvPr id="4" name="Marcador de fecha 3">
             <a:extLst>
               <a:ext uri="{FF2B5EF4-FFF2-40B4-BE49-F238E27FC236}">
-                <a16:creationId xmlns:a16="http://schemas.microsoft.com/office/drawing/2014/main" xmlns="" id="{354769AF-9C20-46C0-97FA-20E3FD27F113}"/>
+                <a16:creationId xmlns:a16="http://schemas.microsoft.com/office/drawing/2014/main" id="{354769AF-9C20-46C0-97FA-20E3FD27F113}"/>
               </a:ext>
             </a:extLst>
           </p:cNvPr>
@@ -2930,7 +2930,7 @@
           <a:p>
             <a:fld id="{2CB0E3BD-6D34-458E-AE7A-74577911A74C}" type="datetimeFigureOut">
               <a:rPr lang="es-AR" smtClean="0"/>
-              <a:t>11/06/2019</a:t>
+              <a:t>1/7/2019</a:t>
             </a:fld>
             <a:endParaRPr lang="es-AR"/>
           </a:p>
@@ -2941,7 +2941,7 @@
           <p:cNvPr id="5" name="Marcador de pie de página 4">
             <a:extLst>
               <a:ext uri="{FF2B5EF4-FFF2-40B4-BE49-F238E27FC236}">
-                <a16:creationId xmlns:a16="http://schemas.microsoft.com/office/drawing/2014/main" xmlns="" id="{C7D4369B-00A9-4D09-86DE-AD844B4BF4B6}"/>
+                <a16:creationId xmlns:a16="http://schemas.microsoft.com/office/drawing/2014/main" id="{C7D4369B-00A9-4D09-86DE-AD844B4BF4B6}"/>
               </a:ext>
             </a:extLst>
           </p:cNvPr>
@@ -2984,7 +2984,7 @@
           <p:cNvPr id="6" name="Marcador de número de diapositiva 5">
             <a:extLst>
               <a:ext uri="{FF2B5EF4-FFF2-40B4-BE49-F238E27FC236}">
-                <a16:creationId xmlns:a16="http://schemas.microsoft.com/office/drawing/2014/main" xmlns="" id="{A8872AD9-EFED-4206-AAAE-727B04CB9D5A}"/>
+                <a16:creationId xmlns:a16="http://schemas.microsoft.com/office/drawing/2014/main" id="{A8872AD9-EFED-4206-AAAE-727B04CB9D5A}"/>
               </a:ext>
             </a:extLst>
           </p:cNvPr>
@@ -3352,7 +3352,7 @@
           <p:cNvPr id="4" name="Rectángulo 3">
             <a:extLst>
               <a:ext uri="{FF2B5EF4-FFF2-40B4-BE49-F238E27FC236}">
-                <a16:creationId xmlns:a16="http://schemas.microsoft.com/office/drawing/2014/main" xmlns="" id="{2CE11C95-0FED-4605-9F77-F6FF3105D1BC}"/>
+                <a16:creationId xmlns:a16="http://schemas.microsoft.com/office/drawing/2014/main" id="{2CE11C95-0FED-4605-9F77-F6FF3105D1BC}"/>
               </a:ext>
             </a:extLst>
           </p:cNvPr>
@@ -3400,7 +3400,7 @@
           <p:cNvPr id="5" name="Rectángulo 4">
             <a:extLst>
               <a:ext uri="{FF2B5EF4-FFF2-40B4-BE49-F238E27FC236}">
-                <a16:creationId xmlns:a16="http://schemas.microsoft.com/office/drawing/2014/main" xmlns="" id="{87A53698-AB2F-4ADA-B505-7D8200A86EDB}"/>
+                <a16:creationId xmlns:a16="http://schemas.microsoft.com/office/drawing/2014/main" id="{87A53698-AB2F-4ADA-B505-7D8200A86EDB}"/>
               </a:ext>
             </a:extLst>
           </p:cNvPr>
@@ -3448,7 +3448,7 @@
           <p:cNvPr id="6" name="Rectángulo 5">
             <a:extLst>
               <a:ext uri="{FF2B5EF4-FFF2-40B4-BE49-F238E27FC236}">
-                <a16:creationId xmlns:a16="http://schemas.microsoft.com/office/drawing/2014/main" xmlns="" id="{AC25E7B8-5B5D-4C8B-9E2D-8DCF85331F1D}"/>
+                <a16:creationId xmlns:a16="http://schemas.microsoft.com/office/drawing/2014/main" id="{AC25E7B8-5B5D-4C8B-9E2D-8DCF85331F1D}"/>
               </a:ext>
             </a:extLst>
           </p:cNvPr>
@@ -3496,7 +3496,7 @@
           <p:cNvPr id="8" name="Conector recto 7">
             <a:extLst>
               <a:ext uri="{FF2B5EF4-FFF2-40B4-BE49-F238E27FC236}">
-                <a16:creationId xmlns:a16="http://schemas.microsoft.com/office/drawing/2014/main" xmlns="" id="{6DB76993-4357-4FFC-A897-16F9F23E4178}"/>
+                <a16:creationId xmlns:a16="http://schemas.microsoft.com/office/drawing/2014/main" id="{6DB76993-4357-4FFC-A897-16F9F23E4178}"/>
               </a:ext>
             </a:extLst>
           </p:cNvPr>
@@ -3541,7 +3541,7 @@
           <p:cNvPr id="9" name="Rectángulo 8">
             <a:extLst>
               <a:ext uri="{FF2B5EF4-FFF2-40B4-BE49-F238E27FC236}">
-                <a16:creationId xmlns:a16="http://schemas.microsoft.com/office/drawing/2014/main" xmlns="" id="{40883D8E-020A-4AAE-83BB-035A7583AB34}"/>
+                <a16:creationId xmlns:a16="http://schemas.microsoft.com/office/drawing/2014/main" id="{40883D8E-020A-4AAE-83BB-035A7583AB34}"/>
               </a:ext>
             </a:extLst>
           </p:cNvPr>
@@ -3591,7 +3591,7 @@
           <p:cNvPr id="10" name="Rectángulo 9">
             <a:extLst>
               <a:ext uri="{FF2B5EF4-FFF2-40B4-BE49-F238E27FC236}">
-                <a16:creationId xmlns:a16="http://schemas.microsoft.com/office/drawing/2014/main" xmlns="" id="{0531E703-FD46-46D0-87CF-8DFBE2B2708D}"/>
+                <a16:creationId xmlns:a16="http://schemas.microsoft.com/office/drawing/2014/main" id="{0531E703-FD46-46D0-87CF-8DFBE2B2708D}"/>
               </a:ext>
             </a:extLst>
           </p:cNvPr>
@@ -3641,7 +3641,7 @@
           <p:cNvPr id="11" name="Rectángulo 10">
             <a:extLst>
               <a:ext uri="{FF2B5EF4-FFF2-40B4-BE49-F238E27FC236}">
-                <a16:creationId xmlns:a16="http://schemas.microsoft.com/office/drawing/2014/main" xmlns="" id="{0B0E63ED-FEF3-4EA5-9D42-8A0412E78E54}"/>
+                <a16:creationId xmlns:a16="http://schemas.microsoft.com/office/drawing/2014/main" id="{0B0E63ED-FEF3-4EA5-9D42-8A0412E78E54}"/>
               </a:ext>
             </a:extLst>
           </p:cNvPr>
@@ -3691,7 +3691,7 @@
           <p:cNvPr id="13" name="Conector recto de flecha 12">
             <a:extLst>
               <a:ext uri="{FF2B5EF4-FFF2-40B4-BE49-F238E27FC236}">
-                <a16:creationId xmlns:a16="http://schemas.microsoft.com/office/drawing/2014/main" xmlns="" id="{1CCF42B9-6A9A-4C55-874E-8410EE747724}"/>
+                <a16:creationId xmlns:a16="http://schemas.microsoft.com/office/drawing/2014/main" id="{1CCF42B9-6A9A-4C55-874E-8410EE747724}"/>
               </a:ext>
             </a:extLst>
           </p:cNvPr>
@@ -3733,7 +3733,7 @@
           <p:cNvPr id="14" name="Conector recto de flecha 13">
             <a:extLst>
               <a:ext uri="{FF2B5EF4-FFF2-40B4-BE49-F238E27FC236}">
-                <a16:creationId xmlns:a16="http://schemas.microsoft.com/office/drawing/2014/main" xmlns="" id="{39782A06-7901-43E2-9141-B924DA218FE1}"/>
+                <a16:creationId xmlns:a16="http://schemas.microsoft.com/office/drawing/2014/main" id="{39782A06-7901-43E2-9141-B924DA218FE1}"/>
               </a:ext>
             </a:extLst>
           </p:cNvPr>
@@ -3776,7 +3776,7 @@
           <p:cNvPr id="17" name="Rectángulo 16">
             <a:extLst>
               <a:ext uri="{FF2B5EF4-FFF2-40B4-BE49-F238E27FC236}">
-                <a16:creationId xmlns:a16="http://schemas.microsoft.com/office/drawing/2014/main" xmlns="" id="{FAD02A30-887B-410A-9A86-EA9E1FDA01CF}"/>
+                <a16:creationId xmlns:a16="http://schemas.microsoft.com/office/drawing/2014/main" id="{FAD02A30-887B-410A-9A86-EA9E1FDA01CF}"/>
               </a:ext>
             </a:extLst>
           </p:cNvPr>
@@ -3825,7 +3825,7 @@
           <p:cNvPr id="20" name="Conector recto de flecha 19">
             <a:extLst>
               <a:ext uri="{FF2B5EF4-FFF2-40B4-BE49-F238E27FC236}">
-                <a16:creationId xmlns:a16="http://schemas.microsoft.com/office/drawing/2014/main" xmlns="" id="{43A35BA7-FA31-44B1-96A3-F5D1781969C5}"/>
+                <a16:creationId xmlns:a16="http://schemas.microsoft.com/office/drawing/2014/main" id="{43A35BA7-FA31-44B1-96A3-F5D1781969C5}"/>
               </a:ext>
             </a:extLst>
           </p:cNvPr>
@@ -3868,7 +3868,7 @@
           <p:cNvPr id="28" name="Rectángulo 27">
             <a:extLst>
               <a:ext uri="{FF2B5EF4-FFF2-40B4-BE49-F238E27FC236}">
-                <a16:creationId xmlns:a16="http://schemas.microsoft.com/office/drawing/2014/main" xmlns="" id="{FBDB5EB4-B2E0-4158-8AA1-4B7C1740FEA1}"/>
+                <a16:creationId xmlns:a16="http://schemas.microsoft.com/office/drawing/2014/main" id="{FBDB5EB4-B2E0-4158-8AA1-4B7C1740FEA1}"/>
               </a:ext>
             </a:extLst>
           </p:cNvPr>
@@ -3916,7 +3916,7 @@
           <p:cNvPr id="29" name="Conector recto de flecha 28">
             <a:extLst>
               <a:ext uri="{FF2B5EF4-FFF2-40B4-BE49-F238E27FC236}">
-                <a16:creationId xmlns:a16="http://schemas.microsoft.com/office/drawing/2014/main" xmlns="" id="{862B72A9-145B-4B8E-B74E-46140751C625}"/>
+                <a16:creationId xmlns:a16="http://schemas.microsoft.com/office/drawing/2014/main" id="{862B72A9-145B-4B8E-B74E-46140751C625}"/>
               </a:ext>
             </a:extLst>
           </p:cNvPr>
@@ -3959,7 +3959,7 @@
           <p:cNvPr id="32" name="Rectángulo 31">
             <a:extLst>
               <a:ext uri="{FF2B5EF4-FFF2-40B4-BE49-F238E27FC236}">
-                <a16:creationId xmlns:a16="http://schemas.microsoft.com/office/drawing/2014/main" xmlns="" id="{0DCECEF9-8740-4F88-B7CB-DE26413C5BE1}"/>
+                <a16:creationId xmlns:a16="http://schemas.microsoft.com/office/drawing/2014/main" id="{0DCECEF9-8740-4F88-B7CB-DE26413C5BE1}"/>
               </a:ext>
             </a:extLst>
           </p:cNvPr>
@@ -4007,7 +4007,7 @@
           <p:cNvPr id="33" name="Conector recto de flecha 32">
             <a:extLst>
               <a:ext uri="{FF2B5EF4-FFF2-40B4-BE49-F238E27FC236}">
-                <a16:creationId xmlns:a16="http://schemas.microsoft.com/office/drawing/2014/main" xmlns="" id="{22D838BF-AE3F-4A7A-8A82-297C29FF9838}"/>
+                <a16:creationId xmlns:a16="http://schemas.microsoft.com/office/drawing/2014/main" id="{22D838BF-AE3F-4A7A-8A82-297C29FF9838}"/>
               </a:ext>
             </a:extLst>
           </p:cNvPr>
@@ -4050,7 +4050,7 @@
           <p:cNvPr id="38" name="Conector recto de flecha 37">
             <a:extLst>
               <a:ext uri="{FF2B5EF4-FFF2-40B4-BE49-F238E27FC236}">
-                <a16:creationId xmlns:a16="http://schemas.microsoft.com/office/drawing/2014/main" xmlns="" id="{5B05AD38-F09C-4454-8F50-58EC3C0333CB}"/>
+                <a16:creationId xmlns:a16="http://schemas.microsoft.com/office/drawing/2014/main" id="{5B05AD38-F09C-4454-8F50-58EC3C0333CB}"/>
               </a:ext>
             </a:extLst>
           </p:cNvPr>
@@ -4093,7 +4093,7 @@
           <p:cNvPr id="40" name="Rectángulo 39">
             <a:extLst>
               <a:ext uri="{FF2B5EF4-FFF2-40B4-BE49-F238E27FC236}">
-                <a16:creationId xmlns:a16="http://schemas.microsoft.com/office/drawing/2014/main" xmlns="" id="{B6B118F2-6FBD-416B-8F32-AE254BC157D9}"/>
+                <a16:creationId xmlns:a16="http://schemas.microsoft.com/office/drawing/2014/main" id="{B6B118F2-6FBD-416B-8F32-AE254BC157D9}"/>
               </a:ext>
             </a:extLst>
           </p:cNvPr>
@@ -4141,7 +4141,7 @@
           <p:cNvPr id="42" name="Rectángulo 41">
             <a:extLst>
               <a:ext uri="{FF2B5EF4-FFF2-40B4-BE49-F238E27FC236}">
-                <a16:creationId xmlns:a16="http://schemas.microsoft.com/office/drawing/2014/main" xmlns="" id="{30D673C7-4357-4738-A00A-634745EB206A}"/>
+                <a16:creationId xmlns:a16="http://schemas.microsoft.com/office/drawing/2014/main" id="{30D673C7-4357-4738-A00A-634745EB206A}"/>
               </a:ext>
             </a:extLst>
           </p:cNvPr>
@@ -4189,7 +4189,7 @@
           <p:cNvPr id="43" name="Conector recto de flecha 42">
             <a:extLst>
               <a:ext uri="{FF2B5EF4-FFF2-40B4-BE49-F238E27FC236}">
-                <a16:creationId xmlns:a16="http://schemas.microsoft.com/office/drawing/2014/main" xmlns="" id="{D1F22346-1E4E-4BA6-B09B-2B9747954B34}"/>
+                <a16:creationId xmlns:a16="http://schemas.microsoft.com/office/drawing/2014/main" id="{D1F22346-1E4E-4BA6-B09B-2B9747954B34}"/>
               </a:ext>
             </a:extLst>
           </p:cNvPr>
@@ -4232,7 +4232,7 @@
           <p:cNvPr id="47" name="Rectángulo 46">
             <a:extLst>
               <a:ext uri="{FF2B5EF4-FFF2-40B4-BE49-F238E27FC236}">
-                <a16:creationId xmlns:a16="http://schemas.microsoft.com/office/drawing/2014/main" xmlns="" id="{F3849B52-3C58-4002-9E25-32F5EFF05B0E}"/>
+                <a16:creationId xmlns:a16="http://schemas.microsoft.com/office/drawing/2014/main" id="{F3849B52-3C58-4002-9E25-32F5EFF05B0E}"/>
               </a:ext>
             </a:extLst>
           </p:cNvPr>
@@ -4280,7 +4280,7 @@
           <p:cNvPr id="48" name="Conector recto de flecha 47">
             <a:extLst>
               <a:ext uri="{FF2B5EF4-FFF2-40B4-BE49-F238E27FC236}">
-                <a16:creationId xmlns:a16="http://schemas.microsoft.com/office/drawing/2014/main" xmlns="" id="{0E29F838-0F13-405C-B65B-1C1EFB6AF717}"/>
+                <a16:creationId xmlns:a16="http://schemas.microsoft.com/office/drawing/2014/main" id="{0E29F838-0F13-405C-B65B-1C1EFB6AF717}"/>
               </a:ext>
             </a:extLst>
           </p:cNvPr>
@@ -4323,7 +4323,7 @@
           <p:cNvPr id="55" name="Rectángulo 54">
             <a:extLst>
               <a:ext uri="{FF2B5EF4-FFF2-40B4-BE49-F238E27FC236}">
-                <a16:creationId xmlns:a16="http://schemas.microsoft.com/office/drawing/2014/main" xmlns="" id="{64936B0D-2982-4EBB-8774-ABA86CDDED2E}"/>
+                <a16:creationId xmlns:a16="http://schemas.microsoft.com/office/drawing/2014/main" id="{64936B0D-2982-4EBB-8774-ABA86CDDED2E}"/>
               </a:ext>
             </a:extLst>
           </p:cNvPr>
@@ -4371,7 +4371,7 @@
           <p:cNvPr id="59" name="Conector recto de flecha 58">
             <a:extLst>
               <a:ext uri="{FF2B5EF4-FFF2-40B4-BE49-F238E27FC236}">
-                <a16:creationId xmlns:a16="http://schemas.microsoft.com/office/drawing/2014/main" xmlns="" id="{58E2A3B2-1A3E-44E2-8422-2539439761B3}"/>
+                <a16:creationId xmlns:a16="http://schemas.microsoft.com/office/drawing/2014/main" id="{58E2A3B2-1A3E-44E2-8422-2539439761B3}"/>
               </a:ext>
             </a:extLst>
           </p:cNvPr>
@@ -4414,7 +4414,7 @@
           <p:cNvPr id="83" name="Rectángulo 82">
             <a:extLst>
               <a:ext uri="{FF2B5EF4-FFF2-40B4-BE49-F238E27FC236}">
-                <a16:creationId xmlns:a16="http://schemas.microsoft.com/office/drawing/2014/main" xmlns="" id="{00B59649-FECF-4D6C-B153-9A9EB1B59215}"/>
+                <a16:creationId xmlns:a16="http://schemas.microsoft.com/office/drawing/2014/main" id="{00B59649-FECF-4D6C-B153-9A9EB1B59215}"/>
               </a:ext>
             </a:extLst>
           </p:cNvPr>
@@ -4462,7 +4462,7 @@
           <p:cNvPr id="90" name="Conector recto de flecha 89">
             <a:extLst>
               <a:ext uri="{FF2B5EF4-FFF2-40B4-BE49-F238E27FC236}">
-                <a16:creationId xmlns:a16="http://schemas.microsoft.com/office/drawing/2014/main" xmlns="" id="{3FF4B281-84BA-4C7D-8CC2-0241DD9E0DEE}"/>
+                <a16:creationId xmlns:a16="http://schemas.microsoft.com/office/drawing/2014/main" id="{3FF4B281-84BA-4C7D-8CC2-0241DD9E0DEE}"/>
               </a:ext>
             </a:extLst>
           </p:cNvPr>
@@ -4482,6 +4482,88 @@
             <a:avLst/>
           </a:prstGeom>
           <a:ln w="19050">
+            <a:tailEnd type="triangle"/>
+          </a:ln>
+        </p:spPr>
+        <p:style>
+          <a:lnRef idx="1">
+            <a:schemeClr val="accent1"/>
+          </a:lnRef>
+          <a:fillRef idx="0">
+            <a:schemeClr val="accent1"/>
+          </a:fillRef>
+          <a:effectRef idx="0">
+            <a:schemeClr val="accent1"/>
+          </a:effectRef>
+          <a:fontRef idx="minor">
+            <a:schemeClr val="tx1"/>
+          </a:fontRef>
+        </p:style>
+      </p:cxnSp>
+      <p:sp>
+        <p:nvSpPr>
+          <p:cNvPr id="27" name="Rectángulo 26">
+            <a:extLst>
+              <a:ext uri="{FF2B5EF4-FFF2-40B4-BE49-F238E27FC236}">
+                <a16:creationId xmlns:a16="http://schemas.microsoft.com/office/drawing/2014/main" id="{2CE11C95-0FED-4605-9F77-F6FF3105D1BC}"/>
+              </a:ext>
+            </a:extLst>
+          </p:cNvPr>
+          <p:cNvSpPr/>
+          <p:nvPr/>
+        </p:nvSpPr>
+        <p:spPr>
+          <a:xfrm>
+            <a:off x="1063334" y="4496355"/>
+            <a:ext cx="1526960" cy="825623"/>
+          </a:xfrm>
+          <a:prstGeom prst="rect">
+            <a:avLst/>
+          </a:prstGeom>
+          <a:ln w="57150"/>
+        </p:spPr>
+        <p:style>
+          <a:lnRef idx="2">
+            <a:schemeClr val="accent1"/>
+          </a:lnRef>
+          <a:fillRef idx="1">
+            <a:schemeClr val="lt1"/>
+          </a:fillRef>
+          <a:effectRef idx="0">
+            <a:schemeClr val="accent1"/>
+          </a:effectRef>
+          <a:fontRef idx="minor">
+            <a:schemeClr val="dk1"/>
+          </a:fontRef>
+        </p:style>
+        <p:txBody>
+          <a:bodyPr rtlCol="0" anchor="ctr"/>
+          <a:lstStyle/>
+          <a:p>
+            <a:pPr algn="ctr"/>
+            <a:r>
+              <a:rPr lang="es-AR" dirty="0" smtClean="0"/>
+              <a:t>Web Service</a:t>
+            </a:r>
+            <a:endParaRPr lang="es-AR" dirty="0"/>
+          </a:p>
+        </p:txBody>
+      </p:sp>
+      <p:cxnSp>
+        <p:nvCxnSpPr>
+          <p:cNvPr id="3" name="Conector recto de flecha 2"/>
+          <p:cNvCxnSpPr/>
+          <p:nvPr/>
+        </p:nvCxnSpPr>
+        <p:spPr>
+          <a:xfrm flipV="1">
+            <a:off x="2611471" y="3733383"/>
+            <a:ext cx="1343117" cy="1243984"/>
+          </a:xfrm>
+          <a:prstGeom prst="straightConnector1">
+            <a:avLst/>
+          </a:prstGeom>
+          <a:ln>
             <a:tailEnd type="triangle"/>
           </a:ln>
         </p:spPr>

</xml_diff>